<commit_message>
221109 PictureControl로 변경전 커밋
- Rect와 이미지를 출력함에 있어 이전에는 비율만 비교해서 어느 길이를 기준으로 할건지만 정했는데 (가로 대비 세로 Ratio가 1이 넘는지) 여러 이미지를 출력해봤더니 각 경우 안에서 다시 경우를 지정해서 이미지 전체를 출력하도록 함.

- 기존 방식에서 PictureControl로 변경하기전 커밋
</commit_message>
<xml_diff>
--- a/ImageViewer 설계.pptx
+++ b/ImageViewer 설계.pptx
@@ -197,7 +197,7 @@
           <a:p>
             <a:fld id="{7D3EE5DC-7EE2-4645-B9EA-6BC015B286FB}" type="datetimeFigureOut">
               <a:rPr lang="ko-KR" altLang="en-US" smtClean="0"/>
-              <a:t>2022-11-08</a:t>
+              <a:t>2022-11-09</a:t>
             </a:fld>
             <a:endParaRPr lang="ko-KR" altLang="en-US"/>
           </a:p>
@@ -738,32 +738,77 @@
           </a:p>
           <a:p>
             <a:r>
+              <a:rPr lang="ko-KR" altLang="en-US" strike="sngStrike" dirty="0"/>
+              <a:t>배율 변화가 사용자에게 편하게 이뤄지려면 이 </a:t>
+            </a:r>
+            <a:r>
+              <a:rPr lang="en-US" altLang="ko-KR" strike="sngStrike" dirty="0" err="1"/>
+              <a:t>xReal</a:t>
+            </a:r>
+            <a:r>
+              <a:rPr lang="ko-KR" altLang="en-US" strike="sngStrike" dirty="0"/>
+              <a:t>과 </a:t>
+            </a:r>
+            <a:r>
+              <a:rPr lang="en-US" altLang="ko-KR" strike="sngStrike" dirty="0" err="1"/>
+              <a:t>yReal</a:t>
+            </a:r>
+            <a:r>
+              <a:rPr lang="ko-KR" altLang="en-US" strike="sngStrike" dirty="0"/>
+              <a:t>이 </a:t>
+            </a:r>
+            <a:r>
+              <a:rPr lang="en-US" altLang="ko-KR" strike="sngStrike" dirty="0" err="1"/>
+              <a:t>Rect</a:t>
+            </a:r>
+            <a:r>
+              <a:rPr lang="ko-KR" altLang="en-US" strike="sngStrike" dirty="0"/>
+              <a:t>의 정중앙에 오도록 되어야 한다</a:t>
+            </a:r>
+            <a:r>
+              <a:rPr lang="en-US" altLang="ko-KR" strike="sngStrike" dirty="0"/>
+              <a:t>.</a:t>
+            </a:r>
+          </a:p>
+          <a:p>
+            <a:endParaRPr lang="en-US" altLang="ko-KR" dirty="0"/>
+          </a:p>
+          <a:p>
+            <a:r>
               <a:rPr lang="ko-KR" altLang="en-US" dirty="0"/>
-              <a:t>배율 변화가 사용자에게 편하게 이뤄지려면 이 </a:t>
-            </a:r>
-            <a:r>
-              <a:rPr lang="en-US" altLang="ko-KR" dirty="0" err="1"/>
-              <a:t>xReal</a:t>
+              <a:t>아니다</a:t>
+            </a:r>
+            <a:r>
+              <a:rPr lang="en-US" altLang="ko-KR" dirty="0"/>
+              <a:t>. </a:t>
             </a:r>
             <a:r>
               <a:rPr lang="ko-KR" altLang="en-US" dirty="0"/>
-              <a:t>과 </a:t>
-            </a:r>
-            <a:r>
-              <a:rPr lang="en-US" altLang="ko-KR" dirty="0" err="1"/>
-              <a:t>yReal</a:t>
+              <a:t>이미지의 출력은 </a:t>
+            </a:r>
+            <a:r>
+              <a:rPr lang="ko-KR" altLang="en-US" dirty="0" err="1"/>
+              <a:t>좌상단</a:t>
             </a:r>
             <a:r>
               <a:rPr lang="ko-KR" altLang="en-US" dirty="0"/>
-              <a:t>이 </a:t>
-            </a:r>
-            <a:r>
-              <a:rPr lang="en-US" altLang="ko-KR" dirty="0" err="1"/>
-              <a:t>Rect</a:t>
+              <a:t> 점을 기준으로 이뤄지므로</a:t>
+            </a:r>
+            <a:r>
+              <a:rPr lang="en-US" altLang="ko-KR" dirty="0"/>
+              <a:t>, </a:t>
             </a:r>
             <a:r>
               <a:rPr lang="ko-KR" altLang="en-US" dirty="0"/>
-              <a:t>의 정중앙에 오도록 되어야 한다</a:t>
+              <a:t>중앙이 아니라 거리를 계산해서 </a:t>
+            </a:r>
+            <a:r>
+              <a:rPr lang="ko-KR" altLang="en-US" dirty="0" err="1"/>
+              <a:t>좌상단</a:t>
+            </a:r>
+            <a:r>
+              <a:rPr lang="ko-KR" altLang="en-US" dirty="0"/>
+              <a:t> 점으로부터 시작해야 한다</a:t>
             </a:r>
             <a:r>
               <a:rPr lang="en-US" altLang="ko-KR" dirty="0"/>
@@ -771,44 +816,96 @@
             </a:r>
           </a:p>
           <a:p>
+            <a:r>
+              <a:rPr lang="ko-KR" altLang="en-US" dirty="0"/>
+              <a:t>아</a:t>
+            </a:r>
+            <a:r>
+              <a:rPr lang="en-US" altLang="ko-KR" dirty="0"/>
+              <a:t>! </a:t>
+            </a:r>
+            <a:r>
+              <a:rPr lang="ko-KR" altLang="en-US" dirty="0"/>
+              <a:t>작은 이미지 기준 찍은 </a:t>
+            </a:r>
+            <a:r>
+              <a:rPr lang="ko-KR" altLang="en-US" dirty="0" err="1"/>
+              <a:t>좌표랑</a:t>
+            </a:r>
+            <a:r>
+              <a:rPr lang="ko-KR" altLang="en-US" dirty="0"/>
+              <a:t> </a:t>
+            </a:r>
+            <a:r>
+              <a:rPr lang="ko-KR" altLang="en-US" dirty="0" err="1"/>
+              <a:t>센터값의</a:t>
+            </a:r>
+            <a:r>
+              <a:rPr lang="ko-KR" altLang="en-US" dirty="0"/>
+              <a:t> 차를 구해서 그 길이를 새로 변하게 된 이미지의 배율 </a:t>
+            </a:r>
+            <a:r>
+              <a:rPr lang="en-US" altLang="ko-KR" dirty="0"/>
+              <a:t>(</a:t>
+            </a:r>
+            <a:r>
+              <a:rPr lang="ko-KR" altLang="en-US" dirty="0"/>
+              <a:t>새 길이</a:t>
+            </a:r>
+            <a:r>
+              <a:rPr lang="en-US" altLang="ko-KR" dirty="0"/>
+              <a:t>/</a:t>
+            </a:r>
+            <a:r>
+              <a:rPr lang="ko-KR" altLang="en-US" dirty="0"/>
+              <a:t>이전길이</a:t>
+            </a:r>
+            <a:r>
+              <a:rPr lang="en-US" altLang="ko-KR" dirty="0"/>
+              <a:t>)</a:t>
+            </a:r>
+            <a:r>
+              <a:rPr lang="ko-KR" altLang="en-US" dirty="0"/>
+              <a:t>만큼 곱하면 새로운 거리가 나옴</a:t>
+            </a:r>
+            <a:r>
+              <a:rPr lang="en-US" altLang="ko-KR" dirty="0"/>
+              <a:t>.</a:t>
+            </a:r>
+            <a:r>
+              <a:rPr lang="en-US" altLang="ko-KR" dirty="0" err="1"/>
+              <a:t>x,y</a:t>
+            </a:r>
+            <a:r>
+              <a:rPr lang="en-US" altLang="ko-KR" dirty="0"/>
+              <a:t> </a:t>
+            </a:r>
+            <a:r>
+              <a:rPr lang="ko-KR" altLang="en-US" dirty="0"/>
+              <a:t>각각 해야 함</a:t>
+            </a:r>
             <a:endParaRPr lang="en-US" altLang="ko-KR" dirty="0"/>
           </a:p>
           <a:p>
             <a:r>
               <a:rPr lang="ko-KR" altLang="en-US" dirty="0"/>
-              <a:t>아니다</a:t>
-            </a:r>
-            <a:r>
-              <a:rPr lang="en-US" altLang="ko-KR" dirty="0"/>
-              <a:t>. </a:t>
+              <a:t>그 거리만큼 기준 </a:t>
+            </a:r>
+            <a:r>
+              <a:rPr lang="ko-KR" altLang="en-US" dirty="0" err="1"/>
+              <a:t>좌표값이</a:t>
             </a:r>
             <a:r>
               <a:rPr lang="ko-KR" altLang="en-US" dirty="0"/>
-              <a:t>이미지의 출력은 </a:t>
+              <a:t> </a:t>
             </a:r>
             <a:r>
               <a:rPr lang="ko-KR" altLang="en-US" dirty="0" err="1"/>
-              <a:t>좌상단</a:t>
+              <a:t>빼져야</a:t>
             </a:r>
             <a:r>
               <a:rPr lang="ko-KR" altLang="en-US" dirty="0"/>
-              <a:t> 점을 기준으로 이뤄지므로</a:t>
-            </a:r>
-            <a:r>
-              <a:rPr lang="en-US" altLang="ko-KR" dirty="0"/>
-              <a:t>, </a:t>
-            </a:r>
-            <a:r>
-              <a:rPr lang="ko-KR" altLang="en-US" dirty="0"/>
-              <a:t>중앙이 아니라 거리를 계산해서 </a:t>
-            </a:r>
-            <a:r>
-              <a:rPr lang="ko-KR" altLang="en-US" dirty="0" err="1"/>
-              <a:t>좌상단</a:t>
-            </a:r>
-            <a:r>
-              <a:rPr lang="ko-KR" altLang="en-US" dirty="0"/>
-              <a:t> 점으로부터 시작해야 한다</a:t>
+              <a:t> 함</a:t>
             </a:r>
             <a:r>
               <a:rPr lang="en-US" altLang="ko-KR"/>
@@ -1001,7 +1098,7 @@
           <a:p>
             <a:fld id="{4D811047-51FD-4548-9BC4-C303D68C4058}" type="datetimeFigureOut">
               <a:rPr lang="ko-KR" altLang="en-US" smtClean="0"/>
-              <a:t>2022-11-08</a:t>
+              <a:t>2022-11-09</a:t>
             </a:fld>
             <a:endParaRPr lang="ko-KR" altLang="en-US"/>
           </a:p>
@@ -1199,7 +1296,7 @@
           <a:p>
             <a:fld id="{4D811047-51FD-4548-9BC4-C303D68C4058}" type="datetimeFigureOut">
               <a:rPr lang="ko-KR" altLang="en-US" smtClean="0"/>
-              <a:t>2022-11-08</a:t>
+              <a:t>2022-11-09</a:t>
             </a:fld>
             <a:endParaRPr lang="ko-KR" altLang="en-US"/>
           </a:p>
@@ -1407,7 +1504,7 @@
           <a:p>
             <a:fld id="{4D811047-51FD-4548-9BC4-C303D68C4058}" type="datetimeFigureOut">
               <a:rPr lang="ko-KR" altLang="en-US" smtClean="0"/>
-              <a:t>2022-11-08</a:t>
+              <a:t>2022-11-09</a:t>
             </a:fld>
             <a:endParaRPr lang="ko-KR" altLang="en-US"/>
           </a:p>
@@ -1605,7 +1702,7 @@
           <a:p>
             <a:fld id="{4D811047-51FD-4548-9BC4-C303D68C4058}" type="datetimeFigureOut">
               <a:rPr lang="ko-KR" altLang="en-US" smtClean="0"/>
-              <a:t>2022-11-08</a:t>
+              <a:t>2022-11-09</a:t>
             </a:fld>
             <a:endParaRPr lang="ko-KR" altLang="en-US"/>
           </a:p>
@@ -1880,7 +1977,7 @@
           <a:p>
             <a:fld id="{4D811047-51FD-4548-9BC4-C303D68C4058}" type="datetimeFigureOut">
               <a:rPr lang="ko-KR" altLang="en-US" smtClean="0"/>
-              <a:t>2022-11-08</a:t>
+              <a:t>2022-11-09</a:t>
             </a:fld>
             <a:endParaRPr lang="ko-KR" altLang="en-US"/>
           </a:p>
@@ -2145,7 +2242,7 @@
           <a:p>
             <a:fld id="{4D811047-51FD-4548-9BC4-C303D68C4058}" type="datetimeFigureOut">
               <a:rPr lang="ko-KR" altLang="en-US" smtClean="0"/>
-              <a:t>2022-11-08</a:t>
+              <a:t>2022-11-09</a:t>
             </a:fld>
             <a:endParaRPr lang="ko-KR" altLang="en-US"/>
           </a:p>
@@ -2557,7 +2654,7 @@
           <a:p>
             <a:fld id="{4D811047-51FD-4548-9BC4-C303D68C4058}" type="datetimeFigureOut">
               <a:rPr lang="ko-KR" altLang="en-US" smtClean="0"/>
-              <a:t>2022-11-08</a:t>
+              <a:t>2022-11-09</a:t>
             </a:fld>
             <a:endParaRPr lang="ko-KR" altLang="en-US"/>
           </a:p>
@@ -2698,7 +2795,7 @@
           <a:p>
             <a:fld id="{4D811047-51FD-4548-9BC4-C303D68C4058}" type="datetimeFigureOut">
               <a:rPr lang="ko-KR" altLang="en-US" smtClean="0"/>
-              <a:t>2022-11-08</a:t>
+              <a:t>2022-11-09</a:t>
             </a:fld>
             <a:endParaRPr lang="ko-KR" altLang="en-US"/>
           </a:p>
@@ -2811,7 +2908,7 @@
           <a:p>
             <a:fld id="{4D811047-51FD-4548-9BC4-C303D68C4058}" type="datetimeFigureOut">
               <a:rPr lang="ko-KR" altLang="en-US" smtClean="0"/>
-              <a:t>2022-11-08</a:t>
+              <a:t>2022-11-09</a:t>
             </a:fld>
             <a:endParaRPr lang="ko-KR" altLang="en-US"/>
           </a:p>
@@ -3122,7 +3219,7 @@
           <a:p>
             <a:fld id="{4D811047-51FD-4548-9BC4-C303D68C4058}" type="datetimeFigureOut">
               <a:rPr lang="ko-KR" altLang="en-US" smtClean="0"/>
-              <a:t>2022-11-08</a:t>
+              <a:t>2022-11-09</a:t>
             </a:fld>
             <a:endParaRPr lang="ko-KR" altLang="en-US"/>
           </a:p>
@@ -3410,7 +3507,7 @@
           <a:p>
             <a:fld id="{4D811047-51FD-4548-9BC4-C303D68C4058}" type="datetimeFigureOut">
               <a:rPr lang="ko-KR" altLang="en-US" smtClean="0"/>
-              <a:t>2022-11-08</a:t>
+              <a:t>2022-11-09</a:t>
             </a:fld>
             <a:endParaRPr lang="ko-KR" altLang="en-US"/>
           </a:p>
@@ -3651,7 +3748,7 @@
           <a:p>
             <a:fld id="{4D811047-51FD-4548-9BC4-C303D68C4058}" type="datetimeFigureOut">
               <a:rPr lang="ko-KR" altLang="en-US" smtClean="0"/>
-              <a:t>2022-11-08</a:t>
+              <a:t>2022-11-09</a:t>
             </a:fld>
             <a:endParaRPr lang="ko-KR" altLang="en-US"/>
           </a:p>
@@ -4672,7 +4769,7 @@
         </p:nvGrpSpPr>
         <p:grpSpPr>
           <a:xfrm>
-            <a:off x="2621750" y="-538268"/>
+            <a:off x="11846107" y="-127865"/>
             <a:ext cx="6121677" cy="6062594"/>
             <a:chOff x="9673811" y="1398998"/>
             <a:chExt cx="6121677" cy="6062594"/>

</xml_diff>